<commit_message>
Changed ResponseMatrices.C code so that I can give as input the mJJ cut. I need this because in there I have my theoretical parton or particle histogram. Also I want to run for the mtt samples for the 2016
</commit_message>
<xml_diff>
--- a/Weekly Meetings/HEP_Weekly_21Oct2020.pptx
+++ b/Weekly Meetings/HEP_Weekly_21Oct2020.pptx
@@ -6,19 +6,21 @@
     <p:sldMasterId id="2147483661" r:id="rId2"/>
   </p:sldMasterIdLst>
   <p:notesMasterIdLst>
-    <p:notesMasterId r:id="rId10"/>
+    <p:notesMasterId r:id="rId12"/>
   </p:notesMasterIdLst>
   <p:handoutMasterIdLst>
-    <p:handoutMasterId r:id="rId11"/>
+    <p:handoutMasterId r:id="rId13"/>
   </p:handoutMasterIdLst>
   <p:sldIdLst>
     <p:sldId id="256" r:id="rId3"/>
     <p:sldId id="568" r:id="rId4"/>
     <p:sldId id="585" r:id="rId5"/>
-    <p:sldId id="589" r:id="rId6"/>
-    <p:sldId id="588" r:id="rId7"/>
-    <p:sldId id="507" r:id="rId8"/>
-    <p:sldId id="587" r:id="rId9"/>
+    <p:sldId id="590" r:id="rId6"/>
+    <p:sldId id="591" r:id="rId7"/>
+    <p:sldId id="592" r:id="rId8"/>
+    <p:sldId id="588" r:id="rId9"/>
+    <p:sldId id="507" r:id="rId10"/>
+    <p:sldId id="587" r:id="rId11"/>
   </p:sldIdLst>
   <p:sldSz cx="12192000" cy="6858000"/>
   <p:notesSz cx="6858000" cy="9144000"/>
@@ -210,7 +212,7 @@
           <a:p>
             <a:fld id="{EC97F6CE-C9BA-5B44-AF0F-C73B1C17650F}" type="datetime1">
               <a:rPr lang="en-US" smtClean="0"/>
-              <a:t>10/20/20</a:t>
+              <a:t>10/21/20</a:t>
             </a:fld>
             <a:endParaRPr lang="en-GB"/>
           </a:p>
@@ -416,7 +418,7 @@
           <a:p>
             <a:fld id="{7F9D4A26-E586-E648-884B-C9B1EA03133F}" type="datetime1">
               <a:rPr lang="en-US" smtClean="0"/>
-              <a:t>10/20/20</a:t>
+              <a:t>10/21/20</a:t>
             </a:fld>
             <a:endParaRPr lang="en-GB"/>
           </a:p>
@@ -750,7 +752,7 @@
           <a:p>
             <a:fld id="{33D9703A-F6B0-E34C-B7F9-5A8864FF4F07}" type="datetime1">
               <a:rPr lang="en-US" smtClean="0"/>
-              <a:t>10/20/20</a:t>
+              <a:t>10/21/20</a:t>
             </a:fld>
             <a:endParaRPr lang="en-GB"/>
           </a:p>
@@ -1018,7 +1020,7 @@
           <a:p>
             <a:fld id="{DC51A3BE-CA11-4547-A39A-766971096B34}" type="datetime1">
               <a:rPr lang="en-US" smtClean="0"/>
-              <a:t>10/20/20</a:t>
+              <a:t>10/21/20</a:t>
             </a:fld>
             <a:endParaRPr lang="en-US" dirty="0"/>
           </a:p>
@@ -1225,7 +1227,7 @@
           <a:p>
             <a:fld id="{42B2CF9A-A7BF-1245-99D9-4054301C36E0}" type="datetime1">
               <a:rPr lang="en-US" smtClean="0"/>
-              <a:t>10/20/20</a:t>
+              <a:t>10/21/20</a:t>
             </a:fld>
             <a:endParaRPr lang="en-US" dirty="0"/>
           </a:p>
@@ -1480,7 +1482,7 @@
           <a:p>
             <a:fld id="{F88F3968-5050-1740-9AB7-A06844E87E5F}" type="datetime1">
               <a:rPr lang="en-US" smtClean="0"/>
-              <a:t>10/20/20</a:t>
+              <a:t>10/21/20</a:t>
             </a:fld>
             <a:endParaRPr lang="en-US" dirty="0"/>
           </a:p>
@@ -1671,7 +1673,7 @@
           <a:p>
             <a:fld id="{6A19A844-E33A-B644-A0FB-7455E93D924C}" type="datetime1">
               <a:rPr lang="en-US" smtClean="0"/>
-              <a:t>10/20/20</a:t>
+              <a:t>10/21/20</a:t>
             </a:fld>
             <a:endParaRPr lang="en-GB"/>
           </a:p>
@@ -1845,7 +1847,7 @@
           <a:p>
             <a:fld id="{F61E92BF-DA59-B546-88AE-9835521A3798}" type="datetime1">
               <a:rPr lang="en-US" smtClean="0"/>
-              <a:t>10/20/20</a:t>
+              <a:t>10/21/20</a:t>
             </a:fld>
             <a:endParaRPr lang="en-GB"/>
           </a:p>
@@ -2095,7 +2097,7 @@
           <a:p>
             <a:fld id="{61C78CAC-926A-EF4D-9608-460C3A301243}" type="datetime1">
               <a:rPr lang="en-US" smtClean="0"/>
-              <a:t>10/20/20</a:t>
+              <a:t>10/21/20</a:t>
             </a:fld>
             <a:endParaRPr lang="en-GB"/>
           </a:p>
@@ -2331,7 +2333,7 @@
           <a:p>
             <a:fld id="{32675A6D-6B9B-6546-A3DC-004E809EED54}" type="datetime1">
               <a:rPr lang="en-US" smtClean="0"/>
-              <a:t>10/20/20</a:t>
+              <a:t>10/21/20</a:t>
             </a:fld>
             <a:endParaRPr lang="en-GB"/>
           </a:p>
@@ -2702,7 +2704,7 @@
           <a:p>
             <a:fld id="{55D89806-B328-B147-9EC9-15D0307996ED}" type="datetime1">
               <a:rPr lang="en-US" smtClean="0"/>
-              <a:t>10/20/20</a:t>
+              <a:t>10/21/20</a:t>
             </a:fld>
             <a:endParaRPr lang="en-GB"/>
           </a:p>
@@ -2824,7 +2826,7 @@
           <a:p>
             <a:fld id="{702FE0D6-14B8-A94B-B441-7BA984189CE2}" type="datetime1">
               <a:rPr lang="en-US" smtClean="0"/>
-              <a:t>10/20/20</a:t>
+              <a:t>10/21/20</a:t>
             </a:fld>
             <a:endParaRPr lang="en-GB"/>
           </a:p>
@@ -2923,7 +2925,7 @@
           <a:p>
             <a:fld id="{4C294EA8-7AEB-3247-9A81-8483D03B0462}" type="datetime1">
               <a:rPr lang="en-US" smtClean="0"/>
-              <a:t>10/20/20</a:t>
+              <a:t>10/21/20</a:t>
             </a:fld>
             <a:endParaRPr lang="en-GB"/>
           </a:p>
@@ -3204,7 +3206,7 @@
           <a:p>
             <a:fld id="{D72E9315-386E-6846-8498-4330F1BBFC0A}" type="datetime1">
               <a:rPr lang="en-US" smtClean="0"/>
-              <a:t>10/20/20</a:t>
+              <a:t>10/21/20</a:t>
             </a:fld>
             <a:endParaRPr lang="en-GB"/>
           </a:p>
@@ -3360,7 +3362,7 @@
           <a:p>
             <a:fld id="{0E394EB9-E681-C34A-89D4-D81E4C62EA5B}" type="datetime1">
               <a:rPr lang="en-US" smtClean="0"/>
-              <a:t>10/20/20</a:t>
+              <a:t>10/21/20</a:t>
             </a:fld>
             <a:endParaRPr lang="en-US" dirty="0"/>
           </a:p>
@@ -3641,7 +3643,7 @@
           <a:p>
             <a:fld id="{E220BF5D-E794-2B42-91EC-2A3B4450069D}" type="datetime1">
               <a:rPr lang="en-US" smtClean="0"/>
-              <a:t>10/20/20</a:t>
+              <a:t>10/21/20</a:t>
             </a:fld>
             <a:endParaRPr lang="en-GB"/>
           </a:p>
@@ -3815,7 +3817,7 @@
           <a:p>
             <a:fld id="{BA4C039E-7082-7D42-AA91-9FF3EF6ADB5B}" type="datetime1">
               <a:rPr lang="en-US" smtClean="0"/>
-              <a:t>10/20/20</a:t>
+              <a:t>10/21/20</a:t>
             </a:fld>
             <a:endParaRPr lang="en-GB"/>
           </a:p>
@@ -3999,7 +4001,7 @@
           <a:p>
             <a:fld id="{2817B3FE-3894-A848-8D78-14007FB2FF94}" type="datetime1">
               <a:rPr lang="en-US" smtClean="0"/>
-              <a:t>10/20/20</a:t>
+              <a:t>10/21/20</a:t>
             </a:fld>
             <a:endParaRPr lang="en-GB"/>
           </a:p>
@@ -4346,7 +4348,7 @@
           <a:p>
             <a:fld id="{2DEEC64B-3E48-2F44-A6A9-A1C06A2C021E}" type="datetime1">
               <a:rPr lang="en-US" smtClean="0"/>
-              <a:t>10/20/20</a:t>
+              <a:t>10/21/20</a:t>
             </a:fld>
             <a:endParaRPr lang="en-US" dirty="0"/>
           </a:p>
@@ -4620,7 +4622,7 @@
           <a:p>
             <a:fld id="{61E195D8-183A-7F4D-8D17-8ADC90214B8A}" type="datetime1">
               <a:rPr lang="en-US" smtClean="0"/>
-              <a:t>10/20/20</a:t>
+              <a:t>10/21/20</a:t>
             </a:fld>
             <a:endParaRPr lang="en-US" dirty="0"/>
           </a:p>
@@ -4998,7 +5000,7 @@
           <a:p>
             <a:fld id="{0DD0A991-48AE-1D43-8113-23F8EAF6681B}" type="datetime1">
               <a:rPr lang="en-US" smtClean="0"/>
-              <a:t>10/20/20</a:t>
+              <a:t>10/21/20</a:t>
             </a:fld>
             <a:endParaRPr lang="en-US" dirty="0"/>
           </a:p>
@@ -5115,7 +5117,7 @@
           <a:p>
             <a:fld id="{DC12579A-EC7F-EB4A-BC5C-80733D051D29}" type="datetime1">
               <a:rPr lang="en-US" smtClean="0"/>
-              <a:t>10/20/20</a:t>
+              <a:t>10/21/20</a:t>
             </a:fld>
             <a:endParaRPr lang="en-US" dirty="0"/>
           </a:p>
@@ -5285,7 +5287,7 @@
           <a:p>
             <a:fld id="{669454CD-6DAB-7942-9B1D-8F3E2B882464}" type="datetime1">
               <a:rPr lang="en-US" smtClean="0"/>
-              <a:t>10/20/20</a:t>
+              <a:t>10/21/20</a:t>
             </a:fld>
             <a:endParaRPr lang="en-US" dirty="0"/>
           </a:p>
@@ -5669,7 +5671,7 @@
           <a:p>
             <a:fld id="{BD2CAD36-D42B-D445-A707-AA59905C7768}" type="datetime1">
               <a:rPr lang="en-US" smtClean="0"/>
-              <a:t>10/20/20</a:t>
+              <a:t>10/21/20</a:t>
             </a:fld>
             <a:endParaRPr lang="en-US" dirty="0"/>
           </a:p>
@@ -6051,7 +6053,7 @@
           <a:p>
             <a:fld id="{2D1D63B8-BB32-E649-92D4-94351543394C}" type="datetime1">
               <a:rPr lang="en-US" smtClean="0"/>
-              <a:t>10/20/20</a:t>
+              <a:t>10/21/20</a:t>
             </a:fld>
             <a:endParaRPr lang="en-US" dirty="0"/>
           </a:p>
@@ -6337,7 +6339,7 @@
           <a:p>
             <a:fld id="{FD02AE22-A9EA-FE42-BAB8-AD1D7606FF2E}" type="datetime1">
               <a:rPr lang="en-US" smtClean="0"/>
-              <a:t>10/20/20</a:t>
+              <a:t>10/21/20</a:t>
             </a:fld>
             <a:endParaRPr lang="en-US" dirty="0"/>
           </a:p>
@@ -7027,7 +7029,7 @@
           <a:p>
             <a:fld id="{307A731C-B4EF-644F-8FDB-2EBA3EC9415A}" type="datetime1">
               <a:rPr lang="en-US" smtClean="0"/>
-              <a:t>10/20/20</a:t>
+              <a:t>10/21/20</a:t>
             </a:fld>
             <a:endParaRPr lang="en-GB"/>
           </a:p>
@@ -8162,33 +8164,22 @@
             <a:pPr algn="ctr"/>
             <a:r>
               <a:rPr lang="en-GB" sz="2800" u="sng" dirty="0"/>
-              <a:t>Angular Distributions </a:t>
-            </a:r>
-            <a:r>
-              <a:rPr lang="en-GB" sz="2800" u="sng" dirty="0" err="1">
-                <a:solidFill>
-                  <a:srgbClr val="FF0000"/>
-                </a:solidFill>
-              </a:rPr>
-              <a:t>mJJ</a:t>
-            </a:r>
-            <a:r>
-              <a:rPr lang="en-GB" sz="2800" u="sng" dirty="0">
-                <a:solidFill>
-                  <a:srgbClr val="FF0000"/>
-                </a:solidFill>
-              </a:rPr>
-              <a:t> &gt; 1TeV</a:t>
-            </a:r>
+              <a:t>Angular Distributions</a:t>
+            </a:r>
+            <a:endParaRPr lang="en-GB" sz="2800" u="sng" dirty="0">
+              <a:solidFill>
+                <a:srgbClr val="FF0000"/>
+              </a:solidFill>
+            </a:endParaRPr>
           </a:p>
         </p:txBody>
       </p:sp>
       <p:pic>
         <p:nvPicPr>
-          <p:cNvPr id="16" name="Picture 15">
+          <p:cNvPr id="22" name="Picture 21">
             <a:extLst>
               <a:ext uri="{FF2B5EF4-FFF2-40B4-BE49-F238E27FC236}">
-                <a16:creationId xmlns:a16="http://schemas.microsoft.com/office/drawing/2014/main" id="{0A97139E-669F-7540-B7E1-0788129BD357}"/>
+                <a16:creationId xmlns:a16="http://schemas.microsoft.com/office/drawing/2014/main" id="{6D5D1F01-89A7-9C4C-A820-E530C49E25E1}"/>
               </a:ext>
             </a:extLst>
           </p:cNvPr>
@@ -8205,8 +8196,8 @@
         </p:blipFill>
         <p:spPr>
           <a:xfrm rot="5400000">
-            <a:off x="6675612" y="-165608"/>
-            <a:ext cx="3012694" cy="4176522"/>
+            <a:off x="954295" y="440625"/>
+            <a:ext cx="4311269" cy="5976747"/>
           </a:xfrm>
           <a:prstGeom prst="rect">
             <a:avLst/>
@@ -8215,10 +8206,10 @@
       </p:pic>
       <p:pic>
         <p:nvPicPr>
-          <p:cNvPr id="18" name="Picture 17">
+          <p:cNvPr id="9" name="Picture 8">
             <a:extLst>
               <a:ext uri="{FF2B5EF4-FFF2-40B4-BE49-F238E27FC236}">
-                <a16:creationId xmlns:a16="http://schemas.microsoft.com/office/drawing/2014/main" id="{98716BED-3284-3243-802A-FD11F7DCF635}"/>
+                <a16:creationId xmlns:a16="http://schemas.microsoft.com/office/drawing/2014/main" id="{9F4AFD89-2E80-6047-B24E-44C90EF722A8}"/>
               </a:ext>
             </a:extLst>
           </p:cNvPr>
@@ -8235,74 +8226,108 @@
         </p:blipFill>
         <p:spPr>
           <a:xfrm rot="5400000">
-            <a:off x="2499090" y="2847086"/>
-            <a:ext cx="3012694" cy="4176522"/>
+            <a:off x="6926436" y="440626"/>
+            <a:ext cx="4311269" cy="5976747"/>
           </a:xfrm>
           <a:prstGeom prst="rect">
             <a:avLst/>
           </a:prstGeom>
         </p:spPr>
       </p:pic>
-      <p:pic>
-        <p:nvPicPr>
-          <p:cNvPr id="20" name="Picture 19">
+      <p:sp>
+        <p:nvSpPr>
+          <p:cNvPr id="3" name="Rectangle 2">
             <a:extLst>
               <a:ext uri="{FF2B5EF4-FFF2-40B4-BE49-F238E27FC236}">
-                <a16:creationId xmlns:a16="http://schemas.microsoft.com/office/drawing/2014/main" id="{99C150B6-188B-4F47-AA21-C423410C44C5}"/>
+                <a16:creationId xmlns:a16="http://schemas.microsoft.com/office/drawing/2014/main" id="{6EDC619E-0989-ED42-8EBC-995BEC362FEF}"/>
               </a:ext>
             </a:extLst>
           </p:cNvPr>
-          <p:cNvPicPr>
-            <a:picLocks noChangeAspect="1"/>
-          </p:cNvPicPr>
+          <p:cNvSpPr/>
           <p:nvPr/>
-        </p:nvPicPr>
-        <p:blipFill>
-          <a:blip r:embed="rId4"/>
-          <a:stretch>
-            <a:fillRect/>
-          </a:stretch>
-        </p:blipFill>
+        </p:nvSpPr>
         <p:spPr>
-          <a:xfrm rot="5400000">
-            <a:off x="6675612" y="2846388"/>
-            <a:ext cx="3012694" cy="4176522"/>
+          <a:xfrm>
+            <a:off x="2513291" y="707278"/>
+            <a:ext cx="1193275" cy="369332"/>
           </a:xfrm>
           <a:prstGeom prst="rect">
             <a:avLst/>
           </a:prstGeom>
         </p:spPr>
-      </p:pic>
-      <p:pic>
-        <p:nvPicPr>
-          <p:cNvPr id="22" name="Picture 21">
+        <p:txBody>
+          <a:bodyPr wrap="none">
+            <a:spAutoFit/>
+          </a:bodyPr>
+          <a:lstStyle/>
+          <a:p>
+            <a:pPr algn="ctr"/>
+            <a:r>
+              <a:rPr lang="en-GB" u="sng" dirty="0" err="1">
+                <a:solidFill>
+                  <a:srgbClr val="FF0000"/>
+                </a:solidFill>
+              </a:rPr>
+              <a:t>mJJ</a:t>
+            </a:r>
+            <a:r>
+              <a:rPr lang="en-GB" u="sng" dirty="0">
+                <a:solidFill>
+                  <a:srgbClr val="FF0000"/>
+                </a:solidFill>
+              </a:rPr>
+              <a:t> &gt; 1TeV</a:t>
+            </a:r>
+          </a:p>
+        </p:txBody>
+      </p:sp>
+      <p:sp>
+        <p:nvSpPr>
+          <p:cNvPr id="12" name="Rectangle 11">
             <a:extLst>
               <a:ext uri="{FF2B5EF4-FFF2-40B4-BE49-F238E27FC236}">
-                <a16:creationId xmlns:a16="http://schemas.microsoft.com/office/drawing/2014/main" id="{6D5D1F01-89A7-9C4C-A820-E530C49E25E1}"/>
+                <a16:creationId xmlns:a16="http://schemas.microsoft.com/office/drawing/2014/main" id="{2831BA1C-6DD2-BA44-ABD0-ADBC0F796558}"/>
               </a:ext>
             </a:extLst>
           </p:cNvPr>
-          <p:cNvPicPr>
-            <a:picLocks noChangeAspect="1"/>
-          </p:cNvPicPr>
+          <p:cNvSpPr/>
           <p:nvPr/>
-        </p:nvPicPr>
-        <p:blipFill>
-          <a:blip r:embed="rId5"/>
-          <a:stretch>
-            <a:fillRect/>
-          </a:stretch>
-        </p:blipFill>
+        </p:nvSpPr>
         <p:spPr>
-          <a:xfrm rot="5400000">
-            <a:off x="2499090" y="-165608"/>
-            <a:ext cx="3012694" cy="4176522"/>
+          <a:xfrm>
+            <a:off x="8485432" y="707278"/>
+            <a:ext cx="1193275" cy="369332"/>
           </a:xfrm>
           <a:prstGeom prst="rect">
             <a:avLst/>
           </a:prstGeom>
         </p:spPr>
-      </p:pic>
+        <p:txBody>
+          <a:bodyPr wrap="none">
+            <a:spAutoFit/>
+          </a:bodyPr>
+          <a:lstStyle/>
+          <a:p>
+            <a:pPr algn="ctr"/>
+            <a:r>
+              <a:rPr lang="en-GB" u="sng" dirty="0" err="1">
+                <a:solidFill>
+                  <a:srgbClr val="FF0000"/>
+                </a:solidFill>
+              </a:rPr>
+              <a:t>mJJ</a:t>
+            </a:r>
+            <a:r>
+              <a:rPr lang="en-GB" u="sng" dirty="0">
+                <a:solidFill>
+                  <a:srgbClr val="FF0000"/>
+                </a:solidFill>
+              </a:rPr>
+              <a:t> &gt; 2TeV</a:t>
+            </a:r>
+          </a:p>
+        </p:txBody>
+      </p:sp>
     </p:spTree>
     <p:extLst>
       <p:ext uri="{BB962C8B-B14F-4D97-AF65-F5344CB8AC3E}">
@@ -8417,7 +8442,7 @@
         </p:nvSpPr>
         <p:spPr>
           <a:xfrm>
-            <a:off x="833491" y="-11880"/>
+            <a:off x="833491" y="-26870"/>
             <a:ext cx="10520413" cy="481238"/>
           </a:xfrm>
           <a:prstGeom prst="rect">
@@ -8453,34 +8478,23 @@
           <a:p>
             <a:pPr algn="ctr"/>
             <a:r>
-              <a:rPr lang="en-GB" sz="2800" u="sng" dirty="0"/>
-              <a:t>Angular Distributions </a:t>
-            </a:r>
-            <a:r>
-              <a:rPr lang="en-GB" sz="2800" u="sng" dirty="0" err="1">
-                <a:solidFill>
-                  <a:srgbClr val="FF0000"/>
-                </a:solidFill>
-              </a:rPr>
-              <a:t>mJJ</a:t>
-            </a:r>
-            <a:r>
-              <a:rPr lang="en-GB" sz="2800" u="sng" dirty="0">
-                <a:solidFill>
-                  <a:srgbClr val="FF0000"/>
-                </a:solidFill>
-              </a:rPr>
-              <a:t> &gt; 2TeV</a:t>
-            </a:r>
+              <a:rPr lang="en-GB" sz="2800" u="sng"/>
+              <a:t>Angular Distributions</a:t>
+            </a:r>
+            <a:endParaRPr lang="en-GB" sz="2800" u="sng" dirty="0">
+              <a:solidFill>
+                <a:srgbClr val="FF0000"/>
+              </a:solidFill>
+            </a:endParaRPr>
           </a:p>
         </p:txBody>
       </p:sp>
       <p:pic>
         <p:nvPicPr>
-          <p:cNvPr id="4" name="Picture 3">
+          <p:cNvPr id="16" name="Picture 15">
             <a:extLst>
               <a:ext uri="{FF2B5EF4-FFF2-40B4-BE49-F238E27FC236}">
-                <a16:creationId xmlns:a16="http://schemas.microsoft.com/office/drawing/2014/main" id="{1F9931E8-E84A-6C48-9453-5E532C95B5E8}"/>
+                <a16:creationId xmlns:a16="http://schemas.microsoft.com/office/drawing/2014/main" id="{0A97139E-669F-7540-B7E1-0788129BD357}"/>
               </a:ext>
             </a:extLst>
           </p:cNvPr>
@@ -8497,8 +8511,8 @@
         </p:blipFill>
         <p:spPr>
           <a:xfrm rot="5400000">
-            <a:off x="2584324" y="-122542"/>
-            <a:ext cx="3012694" cy="4176522"/>
+            <a:off x="949689" y="440625"/>
+            <a:ext cx="4311269" cy="5976747"/>
           </a:xfrm>
           <a:prstGeom prst="rect">
             <a:avLst/>
@@ -8507,10 +8521,10 @@
       </p:pic>
       <p:pic>
         <p:nvPicPr>
-          <p:cNvPr id="6" name="Picture 5">
+          <p:cNvPr id="9" name="Picture 8">
             <a:extLst>
               <a:ext uri="{FF2B5EF4-FFF2-40B4-BE49-F238E27FC236}">
-                <a16:creationId xmlns:a16="http://schemas.microsoft.com/office/drawing/2014/main" id="{B8496E0D-76C9-B14F-844D-E734CF386BDD}"/>
+                <a16:creationId xmlns:a16="http://schemas.microsoft.com/office/drawing/2014/main" id="{3DBC8D94-1D93-B742-B938-5A5E87BE967D}"/>
               </a:ext>
             </a:extLst>
           </p:cNvPr>
@@ -8527,78 +8541,112 @@
         </p:blipFill>
         <p:spPr>
           <a:xfrm rot="5400000">
-            <a:off x="6765551" y="-122542"/>
-            <a:ext cx="3012694" cy="4176522"/>
+            <a:off x="6926436" y="440626"/>
+            <a:ext cx="4311269" cy="5976747"/>
           </a:xfrm>
           <a:prstGeom prst="rect">
             <a:avLst/>
           </a:prstGeom>
         </p:spPr>
       </p:pic>
-      <p:pic>
-        <p:nvPicPr>
-          <p:cNvPr id="9" name="Picture 8">
+      <p:sp>
+        <p:nvSpPr>
+          <p:cNvPr id="10" name="Rectangle 9">
             <a:extLst>
               <a:ext uri="{FF2B5EF4-FFF2-40B4-BE49-F238E27FC236}">
-                <a16:creationId xmlns:a16="http://schemas.microsoft.com/office/drawing/2014/main" id="{C95BA8CF-DF14-9147-958F-ADE2CF65F7F6}"/>
+                <a16:creationId xmlns:a16="http://schemas.microsoft.com/office/drawing/2014/main" id="{136F0C33-D2CC-2944-B041-22B8022E7E5F}"/>
               </a:ext>
             </a:extLst>
           </p:cNvPr>
-          <p:cNvPicPr>
-            <a:picLocks noChangeAspect="1"/>
-          </p:cNvPicPr>
+          <p:cNvSpPr/>
           <p:nvPr/>
-        </p:nvPicPr>
-        <p:blipFill>
-          <a:blip r:embed="rId4"/>
-          <a:stretch>
-            <a:fillRect/>
-          </a:stretch>
-        </p:blipFill>
+        </p:nvSpPr>
         <p:spPr>
-          <a:xfrm rot="5400000">
-            <a:off x="2569334" y="2862076"/>
-            <a:ext cx="3012694" cy="4176522"/>
+          <a:xfrm>
+            <a:off x="2513291" y="707278"/>
+            <a:ext cx="1193275" cy="369332"/>
           </a:xfrm>
           <a:prstGeom prst="rect">
             <a:avLst/>
           </a:prstGeom>
         </p:spPr>
-      </p:pic>
-      <p:pic>
-        <p:nvPicPr>
-          <p:cNvPr id="12" name="Picture 11">
+        <p:txBody>
+          <a:bodyPr wrap="none">
+            <a:spAutoFit/>
+          </a:bodyPr>
+          <a:lstStyle/>
+          <a:p>
+            <a:pPr algn="ctr"/>
+            <a:r>
+              <a:rPr lang="en-GB" u="sng" dirty="0" err="1">
+                <a:solidFill>
+                  <a:srgbClr val="FF0000"/>
+                </a:solidFill>
+              </a:rPr>
+              <a:t>mJJ</a:t>
+            </a:r>
+            <a:r>
+              <a:rPr lang="en-GB" u="sng" dirty="0">
+                <a:solidFill>
+                  <a:srgbClr val="FF0000"/>
+                </a:solidFill>
+              </a:rPr>
+              <a:t> &gt; 1TeV</a:t>
+            </a:r>
+          </a:p>
+        </p:txBody>
+      </p:sp>
+      <p:sp>
+        <p:nvSpPr>
+          <p:cNvPr id="12" name="Rectangle 11">
             <a:extLst>
               <a:ext uri="{FF2B5EF4-FFF2-40B4-BE49-F238E27FC236}">
-                <a16:creationId xmlns:a16="http://schemas.microsoft.com/office/drawing/2014/main" id="{D7863C1D-F9F8-E840-8CCA-7806BF2CACFA}"/>
+                <a16:creationId xmlns:a16="http://schemas.microsoft.com/office/drawing/2014/main" id="{E326C7A1-10D7-514C-BEB0-5A426FB56D35}"/>
               </a:ext>
             </a:extLst>
           </p:cNvPr>
-          <p:cNvPicPr>
-            <a:picLocks noChangeAspect="1"/>
-          </p:cNvPicPr>
+          <p:cNvSpPr/>
           <p:nvPr/>
-        </p:nvPicPr>
-        <p:blipFill>
-          <a:blip r:embed="rId5"/>
-          <a:stretch>
-            <a:fillRect/>
-          </a:stretch>
-        </p:blipFill>
+        </p:nvSpPr>
         <p:spPr>
-          <a:xfrm rot="5400000">
-            <a:off x="6745856" y="2862075"/>
-            <a:ext cx="3012694" cy="4176522"/>
+          <a:xfrm>
+            <a:off x="8485432" y="707278"/>
+            <a:ext cx="1193275" cy="369332"/>
           </a:xfrm>
           <a:prstGeom prst="rect">
             <a:avLst/>
           </a:prstGeom>
         </p:spPr>
-      </p:pic>
+        <p:txBody>
+          <a:bodyPr wrap="none">
+            <a:spAutoFit/>
+          </a:bodyPr>
+          <a:lstStyle/>
+          <a:p>
+            <a:pPr algn="ctr"/>
+            <a:r>
+              <a:rPr lang="en-GB" u="sng" dirty="0" err="1">
+                <a:solidFill>
+                  <a:srgbClr val="FF0000"/>
+                </a:solidFill>
+              </a:rPr>
+              <a:t>mJJ</a:t>
+            </a:r>
+            <a:r>
+              <a:rPr lang="en-GB" u="sng" dirty="0">
+                <a:solidFill>
+                  <a:srgbClr val="FF0000"/>
+                </a:solidFill>
+              </a:rPr>
+              <a:t> &gt; 2TeV</a:t>
+            </a:r>
+          </a:p>
+        </p:txBody>
+      </p:sp>
     </p:spTree>
     <p:extLst>
       <p:ext uri="{BB962C8B-B14F-4D97-AF65-F5344CB8AC3E}">
-        <p14:creationId xmlns:p14="http://schemas.microsoft.com/office/powerpoint/2010/main" val="329889119"/>
+        <p14:creationId xmlns:p14="http://schemas.microsoft.com/office/powerpoint/2010/main" val="3347628815"/>
       </p:ext>
     </p:extLst>
   </p:cSld>
@@ -8709,8 +8757,8 @@
         </p:nvSpPr>
         <p:spPr>
           <a:xfrm>
-            <a:off x="835793" y="2828018"/>
-            <a:ext cx="10520413" cy="600982"/>
+            <a:off x="833491" y="-26870"/>
+            <a:ext cx="10520413" cy="481238"/>
           </a:xfrm>
           <a:prstGeom prst="rect">
             <a:avLst/>
@@ -8746,7 +8794,166 @@
             <a:pPr algn="ctr"/>
             <a:r>
               <a:rPr lang="en-GB" sz="2800" u="sng" dirty="0"/>
-              <a:t>BACKUP</a:t>
+              <a:t>Angular Distributions</a:t>
+            </a:r>
+            <a:endParaRPr lang="en-GB" sz="2800" u="sng" dirty="0">
+              <a:solidFill>
+                <a:srgbClr val="FF0000"/>
+              </a:solidFill>
+            </a:endParaRPr>
+          </a:p>
+        </p:txBody>
+      </p:sp>
+      <p:pic>
+        <p:nvPicPr>
+          <p:cNvPr id="18" name="Picture 17">
+            <a:extLst>
+              <a:ext uri="{FF2B5EF4-FFF2-40B4-BE49-F238E27FC236}">
+                <a16:creationId xmlns:a16="http://schemas.microsoft.com/office/drawing/2014/main" id="{98716BED-3284-3243-802A-FD11F7DCF635}"/>
+              </a:ext>
+            </a:extLst>
+          </p:cNvPr>
+          <p:cNvPicPr>
+            <a:picLocks noChangeAspect="1"/>
+          </p:cNvPicPr>
+          <p:nvPr/>
+        </p:nvPicPr>
+        <p:blipFill>
+          <a:blip r:embed="rId2"/>
+          <a:stretch>
+            <a:fillRect/>
+          </a:stretch>
+        </p:blipFill>
+        <p:spPr>
+          <a:xfrm rot="5400000">
+            <a:off x="954295" y="440626"/>
+            <a:ext cx="4311269" cy="5976747"/>
+          </a:xfrm>
+          <a:prstGeom prst="rect">
+            <a:avLst/>
+          </a:prstGeom>
+        </p:spPr>
+      </p:pic>
+      <p:pic>
+        <p:nvPicPr>
+          <p:cNvPr id="9" name="Picture 8">
+            <a:extLst>
+              <a:ext uri="{FF2B5EF4-FFF2-40B4-BE49-F238E27FC236}">
+                <a16:creationId xmlns:a16="http://schemas.microsoft.com/office/drawing/2014/main" id="{56217D30-9650-4647-8106-24B6B8E29731}"/>
+              </a:ext>
+            </a:extLst>
+          </p:cNvPr>
+          <p:cNvPicPr>
+            <a:picLocks noChangeAspect="1"/>
+          </p:cNvPicPr>
+          <p:nvPr/>
+        </p:nvPicPr>
+        <p:blipFill>
+          <a:blip r:embed="rId3"/>
+          <a:stretch>
+            <a:fillRect/>
+          </a:stretch>
+        </p:blipFill>
+        <p:spPr>
+          <a:xfrm rot="5400000">
+            <a:off x="6926436" y="440626"/>
+            <a:ext cx="4311269" cy="5976747"/>
+          </a:xfrm>
+          <a:prstGeom prst="rect">
+            <a:avLst/>
+          </a:prstGeom>
+        </p:spPr>
+      </p:pic>
+      <p:sp>
+        <p:nvSpPr>
+          <p:cNvPr id="10" name="Rectangle 9">
+            <a:extLst>
+              <a:ext uri="{FF2B5EF4-FFF2-40B4-BE49-F238E27FC236}">
+                <a16:creationId xmlns:a16="http://schemas.microsoft.com/office/drawing/2014/main" id="{67519992-7CFC-CF42-9CA7-088F4F9054AF}"/>
+              </a:ext>
+            </a:extLst>
+          </p:cNvPr>
+          <p:cNvSpPr/>
+          <p:nvPr/>
+        </p:nvSpPr>
+        <p:spPr>
+          <a:xfrm>
+            <a:off x="2513291" y="707278"/>
+            <a:ext cx="1193275" cy="369332"/>
+          </a:xfrm>
+          <a:prstGeom prst="rect">
+            <a:avLst/>
+          </a:prstGeom>
+        </p:spPr>
+        <p:txBody>
+          <a:bodyPr wrap="none">
+            <a:spAutoFit/>
+          </a:bodyPr>
+          <a:lstStyle/>
+          <a:p>
+            <a:pPr algn="ctr"/>
+            <a:r>
+              <a:rPr lang="en-GB" u="sng" dirty="0" err="1">
+                <a:solidFill>
+                  <a:srgbClr val="FF0000"/>
+                </a:solidFill>
+              </a:rPr>
+              <a:t>mJJ</a:t>
+            </a:r>
+            <a:r>
+              <a:rPr lang="en-GB" u="sng" dirty="0">
+                <a:solidFill>
+                  <a:srgbClr val="FF0000"/>
+                </a:solidFill>
+              </a:rPr>
+              <a:t> &gt; 1TeV</a:t>
+            </a:r>
+          </a:p>
+        </p:txBody>
+      </p:sp>
+      <p:sp>
+        <p:nvSpPr>
+          <p:cNvPr id="12" name="Rectangle 11">
+            <a:extLst>
+              <a:ext uri="{FF2B5EF4-FFF2-40B4-BE49-F238E27FC236}">
+                <a16:creationId xmlns:a16="http://schemas.microsoft.com/office/drawing/2014/main" id="{D490168F-F0B4-8A43-9B95-9FC125205129}"/>
+              </a:ext>
+            </a:extLst>
+          </p:cNvPr>
+          <p:cNvSpPr/>
+          <p:nvPr/>
+        </p:nvSpPr>
+        <p:spPr>
+          <a:xfrm>
+            <a:off x="8485432" y="707278"/>
+            <a:ext cx="1193275" cy="369332"/>
+          </a:xfrm>
+          <a:prstGeom prst="rect">
+            <a:avLst/>
+          </a:prstGeom>
+        </p:spPr>
+        <p:txBody>
+          <a:bodyPr wrap="none">
+            <a:spAutoFit/>
+          </a:bodyPr>
+          <a:lstStyle/>
+          <a:p>
+            <a:pPr algn="ctr"/>
+            <a:r>
+              <a:rPr lang="en-GB" u="sng" dirty="0" err="1">
+                <a:solidFill>
+                  <a:srgbClr val="FF0000"/>
+                </a:solidFill>
+              </a:rPr>
+              <a:t>mJJ</a:t>
+            </a:r>
+            <a:r>
+              <a:rPr lang="en-GB" u="sng" dirty="0">
+                <a:solidFill>
+                  <a:srgbClr val="FF0000"/>
+                </a:solidFill>
+              </a:rPr>
+              <a:t> &gt; 2TeV</a:t>
             </a:r>
           </a:p>
         </p:txBody>
@@ -8754,7 +8961,7 @@
     </p:spTree>
     <p:extLst>
       <p:ext uri="{BB962C8B-B14F-4D97-AF65-F5344CB8AC3E}">
-        <p14:creationId xmlns:p14="http://schemas.microsoft.com/office/powerpoint/2010/main" val="1485357141"/>
+        <p14:creationId xmlns:p14="http://schemas.microsoft.com/office/powerpoint/2010/main" val="853673868"/>
       </p:ext>
     </p:extLst>
   </p:cSld>
@@ -8783,6 +8990,477 @@
       </p:grpSpPr>
       <p:sp>
         <p:nvSpPr>
+          <p:cNvPr id="11" name="Footer Placeholder 7">
+            <a:extLst>
+              <a:ext uri="{FF2B5EF4-FFF2-40B4-BE49-F238E27FC236}">
+                <a16:creationId xmlns:a16="http://schemas.microsoft.com/office/drawing/2014/main" id="{59E26047-BD3C-504E-B955-20FE5C8AA1AA}"/>
+              </a:ext>
+            </a:extLst>
+          </p:cNvPr>
+          <p:cNvSpPr>
+            <a:spLocks noGrp="1"/>
+          </p:cNvSpPr>
+          <p:nvPr>
+            <p:ph type="ftr" sz="quarter" idx="11"/>
+          </p:nvPr>
+        </p:nvSpPr>
+        <p:spPr>
+          <a:xfrm>
+            <a:off x="3686185" y="6459785"/>
+            <a:ext cx="4822804" cy="365125"/>
+          </a:xfrm>
+        </p:spPr>
+        <p:txBody>
+          <a:bodyPr/>
+          <a:lstStyle/>
+          <a:p>
+            <a:r>
+              <a:rPr lang="fi-FI" dirty="0"/>
+              <a:t>NTUA G. </a:t>
+            </a:r>
+            <a:r>
+              <a:rPr lang="fi-FI" dirty="0" err="1"/>
+              <a:t>Bakas</a:t>
+            </a:r>
+            <a:endParaRPr lang="en-US" dirty="0"/>
+          </a:p>
+        </p:txBody>
+      </p:sp>
+      <p:sp>
+        <p:nvSpPr>
+          <p:cNvPr id="2" name="Slide Number Placeholder 1">
+            <a:extLst>
+              <a:ext uri="{FF2B5EF4-FFF2-40B4-BE49-F238E27FC236}">
+                <a16:creationId xmlns:a16="http://schemas.microsoft.com/office/drawing/2014/main" id="{AA422B14-CFD2-DA45-ABB4-F85273D6A99E}"/>
+              </a:ext>
+            </a:extLst>
+          </p:cNvPr>
+          <p:cNvSpPr>
+            <a:spLocks noGrp="1"/>
+          </p:cNvSpPr>
+          <p:nvPr>
+            <p:ph type="sldNum" sz="quarter" idx="12"/>
+          </p:nvPr>
+        </p:nvSpPr>
+        <p:spPr/>
+        <p:txBody>
+          <a:bodyPr/>
+          <a:lstStyle/>
+          <a:p>
+            <a:fld id="{4FAB73BC-B049-4115-A692-8D63A059BFB8}" type="slidenum">
+              <a:rPr lang="en-US" smtClean="0"/>
+              <a:pPr/>
+              <a:t>6</a:t>
+            </a:fld>
+            <a:endParaRPr lang="en-US" dirty="0"/>
+          </a:p>
+        </p:txBody>
+      </p:sp>
+      <p:sp>
+        <p:nvSpPr>
+          <p:cNvPr id="7" name="Title 4">
+            <a:extLst>
+              <a:ext uri="{FF2B5EF4-FFF2-40B4-BE49-F238E27FC236}">
+                <a16:creationId xmlns:a16="http://schemas.microsoft.com/office/drawing/2014/main" id="{17B766C6-A25E-7846-9053-B6684037C65A}"/>
+              </a:ext>
+            </a:extLst>
+          </p:cNvPr>
+          <p:cNvSpPr txBox="1">
+            <a:spLocks/>
+          </p:cNvSpPr>
+          <p:nvPr/>
+        </p:nvSpPr>
+        <p:spPr>
+          <a:xfrm>
+            <a:off x="833491" y="-26870"/>
+            <a:ext cx="10520413" cy="481238"/>
+          </a:xfrm>
+          <a:prstGeom prst="rect">
+            <a:avLst/>
+          </a:prstGeom>
+        </p:spPr>
+        <p:txBody>
+          <a:bodyPr vert="horz" lIns="91440" tIns="45720" rIns="91440" bIns="45720" rtlCol="0" anchor="b">
+            <a:noAutofit/>
+          </a:bodyPr>
+          <a:lstStyle>
+            <a:lvl1pPr algn="l" defTabSz="914400" rtl="0" eaLnBrk="1" latinLnBrk="0" hangingPunct="1">
+              <a:lnSpc>
+                <a:spcPct val="85000"/>
+              </a:lnSpc>
+              <a:spcBef>
+                <a:spcPct val="0"/>
+              </a:spcBef>
+              <a:buNone/>
+              <a:defRPr sz="4800" kern="1200" spc="-50" baseline="0">
+                <a:solidFill>
+                  <a:schemeClr val="tx1">
+                    <a:lumMod val="75000"/>
+                    <a:lumOff val="25000"/>
+                  </a:schemeClr>
+                </a:solidFill>
+                <a:latin typeface="+mj-lt"/>
+                <a:ea typeface="+mj-ea"/>
+                <a:cs typeface="+mj-cs"/>
+              </a:defRPr>
+            </a:lvl1pPr>
+          </a:lstStyle>
+          <a:p>
+            <a:pPr algn="ctr"/>
+            <a:r>
+              <a:rPr lang="en-GB" sz="2800" u="sng" dirty="0"/>
+              <a:t>Angular Distributions</a:t>
+            </a:r>
+            <a:endParaRPr lang="en-GB" sz="2800" u="sng" dirty="0">
+              <a:solidFill>
+                <a:srgbClr val="FF0000"/>
+              </a:solidFill>
+            </a:endParaRPr>
+          </a:p>
+        </p:txBody>
+      </p:sp>
+      <p:pic>
+        <p:nvPicPr>
+          <p:cNvPr id="20" name="Picture 19">
+            <a:extLst>
+              <a:ext uri="{FF2B5EF4-FFF2-40B4-BE49-F238E27FC236}">
+                <a16:creationId xmlns:a16="http://schemas.microsoft.com/office/drawing/2014/main" id="{99C150B6-188B-4F47-AA21-C423410C44C5}"/>
+              </a:ext>
+            </a:extLst>
+          </p:cNvPr>
+          <p:cNvPicPr>
+            <a:picLocks noChangeAspect="1"/>
+          </p:cNvPicPr>
+          <p:nvPr/>
+        </p:nvPicPr>
+        <p:blipFill>
+          <a:blip r:embed="rId2"/>
+          <a:stretch>
+            <a:fillRect/>
+          </a:stretch>
+        </p:blipFill>
+        <p:spPr>
+          <a:xfrm rot="5400000">
+            <a:off x="954295" y="440625"/>
+            <a:ext cx="4311269" cy="5976747"/>
+          </a:xfrm>
+          <a:prstGeom prst="rect">
+            <a:avLst/>
+          </a:prstGeom>
+        </p:spPr>
+      </p:pic>
+      <p:pic>
+        <p:nvPicPr>
+          <p:cNvPr id="9" name="Picture 8">
+            <a:extLst>
+              <a:ext uri="{FF2B5EF4-FFF2-40B4-BE49-F238E27FC236}">
+                <a16:creationId xmlns:a16="http://schemas.microsoft.com/office/drawing/2014/main" id="{0FA7467A-11BF-A646-BE6F-58CC2AF9C1AB}"/>
+              </a:ext>
+            </a:extLst>
+          </p:cNvPr>
+          <p:cNvPicPr>
+            <a:picLocks noChangeAspect="1"/>
+          </p:cNvPicPr>
+          <p:nvPr/>
+        </p:nvPicPr>
+        <p:blipFill>
+          <a:blip r:embed="rId3"/>
+          <a:stretch>
+            <a:fillRect/>
+          </a:stretch>
+        </p:blipFill>
+        <p:spPr>
+          <a:xfrm rot="5400000">
+            <a:off x="6926436" y="440626"/>
+            <a:ext cx="4311269" cy="5976747"/>
+          </a:xfrm>
+          <a:prstGeom prst="rect">
+            <a:avLst/>
+          </a:prstGeom>
+        </p:spPr>
+      </p:pic>
+      <p:sp>
+        <p:nvSpPr>
+          <p:cNvPr id="10" name="Rectangle 9">
+            <a:extLst>
+              <a:ext uri="{FF2B5EF4-FFF2-40B4-BE49-F238E27FC236}">
+                <a16:creationId xmlns:a16="http://schemas.microsoft.com/office/drawing/2014/main" id="{71C98F7F-A08E-B244-9AB0-73E65509107C}"/>
+              </a:ext>
+            </a:extLst>
+          </p:cNvPr>
+          <p:cNvSpPr/>
+          <p:nvPr/>
+        </p:nvSpPr>
+        <p:spPr>
+          <a:xfrm>
+            <a:off x="2513291" y="707278"/>
+            <a:ext cx="1193275" cy="369332"/>
+          </a:xfrm>
+          <a:prstGeom prst="rect">
+            <a:avLst/>
+          </a:prstGeom>
+        </p:spPr>
+        <p:txBody>
+          <a:bodyPr wrap="none">
+            <a:spAutoFit/>
+          </a:bodyPr>
+          <a:lstStyle/>
+          <a:p>
+            <a:pPr algn="ctr"/>
+            <a:r>
+              <a:rPr lang="en-GB" u="sng" dirty="0" err="1">
+                <a:solidFill>
+                  <a:srgbClr val="FF0000"/>
+                </a:solidFill>
+              </a:rPr>
+              <a:t>mJJ</a:t>
+            </a:r>
+            <a:r>
+              <a:rPr lang="en-GB" u="sng" dirty="0">
+                <a:solidFill>
+                  <a:srgbClr val="FF0000"/>
+                </a:solidFill>
+              </a:rPr>
+              <a:t> &gt; 1TeV</a:t>
+            </a:r>
+          </a:p>
+        </p:txBody>
+      </p:sp>
+      <p:sp>
+        <p:nvSpPr>
+          <p:cNvPr id="12" name="Rectangle 11">
+            <a:extLst>
+              <a:ext uri="{FF2B5EF4-FFF2-40B4-BE49-F238E27FC236}">
+                <a16:creationId xmlns:a16="http://schemas.microsoft.com/office/drawing/2014/main" id="{5EB50E19-69C6-EC4A-BD00-6ECC4A12C354}"/>
+              </a:ext>
+            </a:extLst>
+          </p:cNvPr>
+          <p:cNvSpPr/>
+          <p:nvPr/>
+        </p:nvSpPr>
+        <p:spPr>
+          <a:xfrm>
+            <a:off x="8485432" y="707278"/>
+            <a:ext cx="1193275" cy="369332"/>
+          </a:xfrm>
+          <a:prstGeom prst="rect">
+            <a:avLst/>
+          </a:prstGeom>
+        </p:spPr>
+        <p:txBody>
+          <a:bodyPr wrap="none">
+            <a:spAutoFit/>
+          </a:bodyPr>
+          <a:lstStyle/>
+          <a:p>
+            <a:pPr algn="ctr"/>
+            <a:r>
+              <a:rPr lang="en-GB" u="sng" dirty="0" err="1">
+                <a:solidFill>
+                  <a:srgbClr val="FF0000"/>
+                </a:solidFill>
+              </a:rPr>
+              <a:t>mJJ</a:t>
+            </a:r>
+            <a:r>
+              <a:rPr lang="en-GB" u="sng" dirty="0">
+                <a:solidFill>
+                  <a:srgbClr val="FF0000"/>
+                </a:solidFill>
+              </a:rPr>
+              <a:t> &gt; 2TeV</a:t>
+            </a:r>
+          </a:p>
+        </p:txBody>
+      </p:sp>
+    </p:spTree>
+    <p:extLst>
+      <p:ext uri="{BB962C8B-B14F-4D97-AF65-F5344CB8AC3E}">
+        <p14:creationId xmlns:p14="http://schemas.microsoft.com/office/powerpoint/2010/main" val="1450015534"/>
+      </p:ext>
+    </p:extLst>
+  </p:cSld>
+  <p:clrMapOvr>
+    <a:masterClrMapping/>
+  </p:clrMapOvr>
+</p:sld>
+</file>
+
+<file path=ppt/slides/slide7.xml><?xml version="1.0" encoding="utf-8"?>
+<p:sld xmlns:a="http://schemas.openxmlformats.org/drawingml/2006/main" xmlns:r="http://schemas.openxmlformats.org/officeDocument/2006/relationships" xmlns:p="http://schemas.openxmlformats.org/presentationml/2006/main">
+  <p:cSld>
+    <p:spTree>
+      <p:nvGrpSpPr>
+        <p:cNvPr id="1" name=""/>
+        <p:cNvGrpSpPr/>
+        <p:nvPr/>
+      </p:nvGrpSpPr>
+      <p:grpSpPr>
+        <a:xfrm>
+          <a:off x="0" y="0"/>
+          <a:ext cx="0" cy="0"/>
+          <a:chOff x="0" y="0"/>
+          <a:chExt cx="0" cy="0"/>
+        </a:xfrm>
+      </p:grpSpPr>
+      <p:sp>
+        <p:nvSpPr>
+          <p:cNvPr id="11" name="Footer Placeholder 7">
+            <a:extLst>
+              <a:ext uri="{FF2B5EF4-FFF2-40B4-BE49-F238E27FC236}">
+                <a16:creationId xmlns:a16="http://schemas.microsoft.com/office/drawing/2014/main" id="{59E26047-BD3C-504E-B955-20FE5C8AA1AA}"/>
+              </a:ext>
+            </a:extLst>
+          </p:cNvPr>
+          <p:cNvSpPr>
+            <a:spLocks noGrp="1"/>
+          </p:cNvSpPr>
+          <p:nvPr>
+            <p:ph type="ftr" sz="quarter" idx="11"/>
+          </p:nvPr>
+        </p:nvSpPr>
+        <p:spPr>
+          <a:xfrm>
+            <a:off x="3686185" y="6459785"/>
+            <a:ext cx="4822804" cy="365125"/>
+          </a:xfrm>
+        </p:spPr>
+        <p:txBody>
+          <a:bodyPr/>
+          <a:lstStyle/>
+          <a:p>
+            <a:r>
+              <a:rPr lang="fi-FI" dirty="0"/>
+              <a:t>NTUA G. </a:t>
+            </a:r>
+            <a:r>
+              <a:rPr lang="fi-FI" dirty="0" err="1"/>
+              <a:t>Bakas</a:t>
+            </a:r>
+            <a:endParaRPr lang="en-US" dirty="0"/>
+          </a:p>
+        </p:txBody>
+      </p:sp>
+      <p:sp>
+        <p:nvSpPr>
+          <p:cNvPr id="2" name="Slide Number Placeholder 1">
+            <a:extLst>
+              <a:ext uri="{FF2B5EF4-FFF2-40B4-BE49-F238E27FC236}">
+                <a16:creationId xmlns:a16="http://schemas.microsoft.com/office/drawing/2014/main" id="{AA422B14-CFD2-DA45-ABB4-F85273D6A99E}"/>
+              </a:ext>
+            </a:extLst>
+          </p:cNvPr>
+          <p:cNvSpPr>
+            <a:spLocks noGrp="1"/>
+          </p:cNvSpPr>
+          <p:nvPr>
+            <p:ph type="sldNum" sz="quarter" idx="12"/>
+          </p:nvPr>
+        </p:nvSpPr>
+        <p:spPr/>
+        <p:txBody>
+          <a:bodyPr/>
+          <a:lstStyle/>
+          <a:p>
+            <a:fld id="{4FAB73BC-B049-4115-A692-8D63A059BFB8}" type="slidenum">
+              <a:rPr lang="en-US" smtClean="0"/>
+              <a:pPr/>
+              <a:t>7</a:t>
+            </a:fld>
+            <a:endParaRPr lang="en-US" dirty="0"/>
+          </a:p>
+        </p:txBody>
+      </p:sp>
+      <p:sp>
+        <p:nvSpPr>
+          <p:cNvPr id="7" name="Title 4">
+            <a:extLst>
+              <a:ext uri="{FF2B5EF4-FFF2-40B4-BE49-F238E27FC236}">
+                <a16:creationId xmlns:a16="http://schemas.microsoft.com/office/drawing/2014/main" id="{17B766C6-A25E-7846-9053-B6684037C65A}"/>
+              </a:ext>
+            </a:extLst>
+          </p:cNvPr>
+          <p:cNvSpPr txBox="1">
+            <a:spLocks/>
+          </p:cNvSpPr>
+          <p:nvPr/>
+        </p:nvSpPr>
+        <p:spPr>
+          <a:xfrm>
+            <a:off x="835793" y="2828018"/>
+            <a:ext cx="10520413" cy="600982"/>
+          </a:xfrm>
+          <a:prstGeom prst="rect">
+            <a:avLst/>
+          </a:prstGeom>
+        </p:spPr>
+        <p:txBody>
+          <a:bodyPr vert="horz" lIns="91440" tIns="45720" rIns="91440" bIns="45720" rtlCol="0" anchor="b">
+            <a:noAutofit/>
+          </a:bodyPr>
+          <a:lstStyle>
+            <a:lvl1pPr algn="l" defTabSz="914400" rtl="0" eaLnBrk="1" latinLnBrk="0" hangingPunct="1">
+              <a:lnSpc>
+                <a:spcPct val="85000"/>
+              </a:lnSpc>
+              <a:spcBef>
+                <a:spcPct val="0"/>
+              </a:spcBef>
+              <a:buNone/>
+              <a:defRPr sz="4800" kern="1200" spc="-50" baseline="0">
+                <a:solidFill>
+                  <a:schemeClr val="tx1">
+                    <a:lumMod val="75000"/>
+                    <a:lumOff val="25000"/>
+                  </a:schemeClr>
+                </a:solidFill>
+                <a:latin typeface="+mj-lt"/>
+                <a:ea typeface="+mj-ea"/>
+                <a:cs typeface="+mj-cs"/>
+              </a:defRPr>
+            </a:lvl1pPr>
+          </a:lstStyle>
+          <a:p>
+            <a:pPr algn="ctr"/>
+            <a:r>
+              <a:rPr lang="en-GB" sz="2800" u="sng" dirty="0"/>
+              <a:t>BACKUP</a:t>
+            </a:r>
+          </a:p>
+        </p:txBody>
+      </p:sp>
+    </p:spTree>
+    <p:extLst>
+      <p:ext uri="{BB962C8B-B14F-4D97-AF65-F5344CB8AC3E}">
+        <p14:creationId xmlns:p14="http://schemas.microsoft.com/office/powerpoint/2010/main" val="1485357141"/>
+      </p:ext>
+    </p:extLst>
+  </p:cSld>
+  <p:clrMapOvr>
+    <a:masterClrMapping/>
+  </p:clrMapOvr>
+</p:sld>
+</file>
+
+<file path=ppt/slides/slide8.xml><?xml version="1.0" encoding="utf-8"?>
+<p:sld xmlns:a="http://schemas.openxmlformats.org/drawingml/2006/main" xmlns:r="http://schemas.openxmlformats.org/officeDocument/2006/relationships" xmlns:p="http://schemas.openxmlformats.org/presentationml/2006/main">
+  <p:cSld>
+    <p:spTree>
+      <p:nvGrpSpPr>
+        <p:cNvPr id="1" name=""/>
+        <p:cNvGrpSpPr/>
+        <p:nvPr/>
+      </p:nvGrpSpPr>
+      <p:grpSpPr>
+        <a:xfrm>
+          <a:off x="0" y="0"/>
+          <a:ext cx="0" cy="0"/>
+          <a:chOff x="0" y="0"/>
+          <a:chExt cx="0" cy="0"/>
+        </a:xfrm>
+      </p:grpSpPr>
+      <p:sp>
+        <p:nvSpPr>
           <p:cNvPr id="3" name="Footer Placeholder 2"/>
           <p:cNvSpPr>
             <a:spLocks noGrp="1"/>
@@ -8872,7 +9550,7 @@
             <a:fld id="{4FAB73BC-B049-4115-A692-8D63A059BFB8}" type="slidenum">
               <a:rPr lang="en-US" smtClean="0"/>
               <a:pPr/>
-              <a:t>6</a:t>
+              <a:t>8</a:t>
             </a:fld>
             <a:endParaRPr lang="en-US" dirty="0"/>
           </a:p>
@@ -8901,7 +9579,7 @@
           <a:p>
             <a:fld id="{F7AFF6A5-F1FB-284A-BF72-2836D5A0B341}" type="datetime1">
               <a:rPr lang="en-US" smtClean="0"/>
-              <a:t>10/20/20</a:t>
+              <a:t>10/21/20</a:t>
             </a:fld>
             <a:endParaRPr lang="en-US" dirty="0"/>
           </a:p>
@@ -9914,7 +10592,7 @@
 </p:sld>
 </file>
 
-<file path=ppt/slides/slide7.xml><?xml version="1.0" encoding="utf-8"?>
+<file path=ppt/slides/slide9.xml><?xml version="1.0" encoding="utf-8"?>
 <p:sld xmlns:a="http://schemas.openxmlformats.org/drawingml/2006/main" xmlns:r="http://schemas.openxmlformats.org/officeDocument/2006/relationships" xmlns:p="http://schemas.openxmlformats.org/presentationml/2006/main">
   <p:cSld>
     <p:spTree>
@@ -10050,7 +10728,7 @@
             <a:fld id="{4FAB73BC-B049-4115-A692-8D63A059BFB8}" type="slidenum">
               <a:rPr lang="en-US" smtClean="0"/>
               <a:pPr/>
-              <a:t>7</a:t>
+              <a:t>9</a:t>
             </a:fld>
             <a:endParaRPr lang="en-US" dirty="0"/>
           </a:p>

</xml_diff>